<commit_message>
[MT M] Revisioni alla presentazione di Luca
</commit_message>
<xml_diff>
--- a/Presentazione/Atsilo2/Luca/Luca_PresentazioneFinale.pptx
+++ b/Presentazione/Atsilo2/Luca/Luca_PresentazioneFinale.pptx
@@ -121,6 +121,78 @@
 </p:presentation>
 </file>
 
+<file path=ppt/commentAuthors.xml><?xml version="1.0" encoding="utf-8"?>
+<p:cmAuthorLst xmlns:a="http://schemas.openxmlformats.org/drawingml/2006/main" xmlns:r="http://schemas.openxmlformats.org/officeDocument/2006/relationships" xmlns:p="http://schemas.openxmlformats.org/presentationml/2006/main">
+  <p:cmAuthor id="0" name="Giulio" initials="GF" lastIdx="8" clrIdx="0"/>
+</p:cmAuthorLst>
+</file>
+
+<file path=ppt/comments/comment1.xml><?xml version="1.0" encoding="utf-8"?>
+<p:cmLst xmlns:a="http://schemas.openxmlformats.org/drawingml/2006/main" xmlns:r="http://schemas.openxmlformats.org/officeDocument/2006/relationships" xmlns:p="http://schemas.openxmlformats.org/presentationml/2006/main">
+  <p:cm authorId="0" dt="2012-12-30T14:38:47.282" idx="1">
+    <p:pos x="10" y="10"/>
+    <p:text>Potrebbe non servire, in dipendenza di cosa dicono gli altri</p:text>
+  </p:cm>
+</p:cmLst>
+</file>
+
+<file path=ppt/comments/comment2.xml><?xml version="1.0" encoding="utf-8"?>
+<p:cmLst xmlns:a="http://schemas.openxmlformats.org/drawingml/2006/main" xmlns:r="http://schemas.openxmlformats.org/officeDocument/2006/relationships" xmlns:p="http://schemas.openxmlformats.org/presentationml/2006/main">
+  <p:cm authorId="0" dt="2012-12-30T14:40:46.020" idx="2">
+    <p:pos x="2" y="10"/>
+    <p:text>Molto belle, queste tre slide, però assicurati di non sovrapporti ad altri degli altri team, come argomenti.
+Puoi controllare le bozze che girano su svn.</p:text>
+  </p:cm>
+</p:cmLst>
+</file>
+
+<file path=ppt/comments/comment3.xml><?xml version="1.0" encoding="utf-8"?>
+<p:cmLst xmlns:a="http://schemas.openxmlformats.org/drawingml/2006/main" xmlns:r="http://schemas.openxmlformats.org/officeDocument/2006/relationships" xmlns:p="http://schemas.openxmlformats.org/presentationml/2006/main">
+  <p:cm authorId="0" dt="2012-12-30T14:41:42.142" idx="3">
+    <p:pos x="10" y="10"/>
+    <p:text>Se possibile, parti subito col diagramma.
+Per una maggiore leggibilità, esportalo in un formato vettoriale (svg, wmf, ...).</p:text>
+  </p:cm>
+</p:cmLst>
+</file>
+
+<file path=ppt/comments/comment4.xml><?xml version="1.0" encoding="utf-8"?>
+<p:cmLst xmlns:a="http://schemas.openxmlformats.org/drawingml/2006/main" xmlns:r="http://schemas.openxmlformats.org/officeDocument/2006/relationships" xmlns:p="http://schemas.openxmlformats.org/presentationml/2006/main">
+  <p:cm authorId="0" dt="2012-12-30T14:44:57.761" idx="6">
+    <p:pos x="10" y="10"/>
+    <p:text>Per ricapitolare, potrebbe essere utile se, nel diagramma, inserisci le specializzazioni dell'attore EventPlanner.
+Leggendo utente del sistema, uno un'idea se la fa. EventPlanner, invece, a meno di ricordarlo, è difficilmente ricollegabile.</p:text>
+  </p:cm>
+</p:cmLst>
+</file>
+
+<file path=ppt/comments/comment5.xml><?xml version="1.0" encoding="utf-8"?>
+<p:cmLst xmlns:a="http://schemas.openxmlformats.org/drawingml/2006/main" xmlns:r="http://schemas.openxmlformats.org/officeDocument/2006/relationships" xmlns:p="http://schemas.openxmlformats.org/presentationml/2006/main">
+  <p:cm authorId="0" dt="2012-12-30T14:42:39.447" idx="4">
+    <p:pos x="10" y="10"/>
+    <p:text>Anche se non sono i tuoi, potrebbe essere una buona idea far riferimento ai casi d'uso relativi.</p:text>
+  </p:cm>
+</p:cmLst>
+</file>
+
+<file path=ppt/comments/comment6.xml><?xml version="1.0" encoding="utf-8"?>
+<p:cmLst xmlns:a="http://schemas.openxmlformats.org/drawingml/2006/main" xmlns:r="http://schemas.openxmlformats.org/officeDocument/2006/relationships" xmlns:p="http://schemas.openxmlformats.org/presentationml/2006/main">
+  <p:cm authorId="0" dt="2012-12-30T14:43:32.326" idx="5">
+    <p:pos x="5647" y="1196"/>
+    <p:text>E' un'affermazione forte, dovresti motivare le ragioni di questa scelta, almeno a voce.</p:text>
+  </p:cm>
+</p:cmLst>
+</file>
+
+<file path=ppt/comments/comment7.xml><?xml version="1.0" encoding="utf-8"?>
+<p:cmLst xmlns:a="http://schemas.openxmlformats.org/drawingml/2006/main" xmlns:r="http://schemas.openxmlformats.org/officeDocument/2006/relationships" xmlns:p="http://schemas.openxmlformats.org/presentationml/2006/main">
+  <p:cm authorId="0" dt="2012-12-30T14:49:20.556" idx="8">
+    <p:pos x="10" y="10"/>
+    <p:text>Ti ho aggiunto delle note sotto. Risistemale in modo che non sembrino mie.</p:text>
+  </p:cm>
+</p:cmLst>
+</file>
+
 <file path=ppt/notesMasters/notesMaster1.xml><?xml version="1.0" encoding="utf-8"?>
 <p:notesMaster xmlns:a="http://schemas.openxmlformats.org/drawingml/2006/main" xmlns:r="http://schemas.openxmlformats.org/officeDocument/2006/relationships" xmlns:p="http://schemas.openxmlformats.org/presentationml/2006/main">
   <p:cSld>
@@ -204,7 +276,7 @@
             <a:fld id="{38D78F4D-402C-46E0-A4BB-DF91EA86B14C}" type="datetimeFigureOut">
               <a:rPr lang="it-IT" smtClean="0"/>
               <a:pPr/>
-              <a:t>27/12/2012</a:t>
+              <a:t>30/12/2012</a:t>
             </a:fld>
             <a:endParaRPr lang="it-IT"/>
           </a:p>
@@ -373,7 +445,7 @@
     </p:spTree>
     <p:extLst>
       <p:ext uri="{BB962C8B-B14F-4D97-AF65-F5344CB8AC3E}">
-        <p14:creationId xmlns="" xmlns:p14="http://schemas.microsoft.com/office/powerpoint/2010/main" val="2126419590"/>
+        <p14:creationId xmlns:p14="http://schemas.microsoft.com/office/powerpoint/2010/main" xmlns="" val="2126419590"/>
       </p:ext>
     </p:extLst>
   </p:cSld>
@@ -691,6 +763,64 @@
           </a:bodyPr>
           <a:lstStyle/>
           <a:p>
+            <a:r>
+              <a:rPr lang="it-IT" dirty="0" err="1" smtClean="0"/>
+              <a:t>-----questo</a:t>
+            </a:r>
+            <a:r>
+              <a:rPr lang="it-IT" dirty="0" smtClean="0"/>
+              <a:t> non devi dirlo per forza</a:t>
+            </a:r>
+            <a:r>
+              <a:rPr lang="it-IT" baseline="0" dirty="0" smtClean="0"/>
+              <a:t>, ma può essere utile per rispondere a qualche </a:t>
+            </a:r>
+            <a:r>
+              <a:rPr lang="it-IT" baseline="0" dirty="0" err="1" smtClean="0"/>
+              <a:t>domanda-----</a:t>
+            </a:r>
+            <a:endParaRPr lang="it-IT" baseline="0" dirty="0" smtClean="0"/>
+          </a:p>
+          <a:p>
+            <a:r>
+              <a:rPr lang="it-IT" baseline="0" dirty="0" smtClean="0"/>
+              <a:t>NdR1: usiamo il singleton per evitare di creare un’istanza di </a:t>
+            </a:r>
+            <a:r>
+              <a:rPr lang="it-IT" baseline="0" dirty="0" err="1" smtClean="0"/>
+              <a:t>control</a:t>
+            </a:r>
+            <a:r>
+              <a:rPr lang="it-IT" baseline="0" dirty="0" smtClean="0"/>
+              <a:t> a ogni richiesta, poiché questo introdurrebbe un ritardo, e incrementerebbe l’utilizzo di memoria RAM.</a:t>
+            </a:r>
+            <a:endParaRPr lang="it-IT" dirty="0" smtClean="0"/>
+          </a:p>
+          <a:p>
+            <a:r>
+              <a:rPr lang="it-IT" dirty="0" smtClean="0"/>
+              <a:t>NdR2:</a:t>
+            </a:r>
+            <a:r>
+              <a:rPr lang="it-IT" baseline="0" dirty="0" smtClean="0"/>
+              <a:t> i </a:t>
+            </a:r>
+            <a:r>
+              <a:rPr lang="it-IT" baseline="0" dirty="0" err="1" smtClean="0"/>
+              <a:t>control</a:t>
+            </a:r>
+            <a:r>
+              <a:rPr lang="it-IT" baseline="0" dirty="0" smtClean="0"/>
+              <a:t> non hanno variabili di istanza, poiché queste sarebbero accedute in concorrenza da più </a:t>
+            </a:r>
+            <a:r>
+              <a:rPr lang="it-IT" baseline="0" dirty="0" err="1" smtClean="0"/>
+              <a:t>thread</a:t>
+            </a:r>
+            <a:r>
+              <a:rPr lang="it-IT" baseline="0" dirty="0" smtClean="0"/>
+              <a:t>, e quindi si avrebbero problemi di concorrenza.</a:t>
+            </a:r>
             <a:endParaRPr lang="it-IT" dirty="0"/>
           </a:p>
         </p:txBody>
@@ -1671,7 +1801,7 @@
             <a:fld id="{63CABBC0-75E4-43BB-A6A6-84C2A96BDB82}" type="datetimeFigureOut">
               <a:rPr lang="it-IT" smtClean="0"/>
               <a:pPr/>
-              <a:t>27/12/2012</a:t>
+              <a:t>30/12/2012</a:t>
             </a:fld>
             <a:endParaRPr lang="it-IT"/>
           </a:p>
@@ -1853,7 +1983,7 @@
             <a:fld id="{63CABBC0-75E4-43BB-A6A6-84C2A96BDB82}" type="datetimeFigureOut">
               <a:rPr lang="it-IT" smtClean="0"/>
               <a:pPr/>
-              <a:t>27/12/2012</a:t>
+              <a:t>30/12/2012</a:t>
             </a:fld>
             <a:endParaRPr lang="it-IT"/>
           </a:p>
@@ -2045,7 +2175,7 @@
             <a:fld id="{63CABBC0-75E4-43BB-A6A6-84C2A96BDB82}" type="datetimeFigureOut">
               <a:rPr lang="it-IT" smtClean="0"/>
               <a:pPr/>
-              <a:t>27/12/2012</a:t>
+              <a:t>30/12/2012</a:t>
             </a:fld>
             <a:endParaRPr lang="it-IT"/>
           </a:p>
@@ -2227,7 +2357,7 @@
             <a:fld id="{63CABBC0-75E4-43BB-A6A6-84C2A96BDB82}" type="datetimeFigureOut">
               <a:rPr lang="it-IT" smtClean="0"/>
               <a:pPr/>
-              <a:t>27/12/2012</a:t>
+              <a:t>30/12/2012</a:t>
             </a:fld>
             <a:endParaRPr lang="it-IT"/>
           </a:p>
@@ -2470,7 +2600,7 @@
             <a:fld id="{63CABBC0-75E4-43BB-A6A6-84C2A96BDB82}" type="datetimeFigureOut">
               <a:rPr lang="it-IT" smtClean="0"/>
               <a:pPr/>
-              <a:t>27/12/2012</a:t>
+              <a:t>30/12/2012</a:t>
             </a:fld>
             <a:endParaRPr lang="it-IT"/>
           </a:p>
@@ -2751,7 +2881,7 @@
             <a:fld id="{63CABBC0-75E4-43BB-A6A6-84C2A96BDB82}" type="datetimeFigureOut">
               <a:rPr lang="it-IT" smtClean="0"/>
               <a:pPr/>
-              <a:t>27/12/2012</a:t>
+              <a:t>30/12/2012</a:t>
             </a:fld>
             <a:endParaRPr lang="it-IT"/>
           </a:p>
@@ -3142,7 +3272,7 @@
             <a:fld id="{63CABBC0-75E4-43BB-A6A6-84C2A96BDB82}" type="datetimeFigureOut">
               <a:rPr lang="it-IT" smtClean="0"/>
               <a:pPr/>
-              <a:t>27/12/2012</a:t>
+              <a:t>30/12/2012</a:t>
             </a:fld>
             <a:endParaRPr lang="it-IT"/>
           </a:p>
@@ -3301,7 +3431,7 @@
             <a:fld id="{63CABBC0-75E4-43BB-A6A6-84C2A96BDB82}" type="datetimeFigureOut">
               <a:rPr lang="it-IT" smtClean="0"/>
               <a:pPr/>
-              <a:t>27/12/2012</a:t>
+              <a:t>30/12/2012</a:t>
             </a:fld>
             <a:endParaRPr lang="it-IT"/>
           </a:p>
@@ -3400,7 +3530,7 @@
             <a:fld id="{63CABBC0-75E4-43BB-A6A6-84C2A96BDB82}" type="datetimeFigureOut">
               <a:rPr lang="it-IT" smtClean="0"/>
               <a:pPr/>
-              <a:t>27/12/2012</a:t>
+              <a:t>30/12/2012</a:t>
             </a:fld>
             <a:endParaRPr lang="it-IT"/>
           </a:p>
@@ -3670,7 +3800,7 @@
             <a:fld id="{63CABBC0-75E4-43BB-A6A6-84C2A96BDB82}" type="datetimeFigureOut">
               <a:rPr lang="it-IT" smtClean="0"/>
               <a:pPr/>
-              <a:t>27/12/2012</a:t>
+              <a:t>30/12/2012</a:t>
             </a:fld>
             <a:endParaRPr lang="it-IT"/>
           </a:p>
@@ -3967,7 +4097,7 @@
             <a:fld id="{63CABBC0-75E4-43BB-A6A6-84C2A96BDB82}" type="datetimeFigureOut">
               <a:rPr lang="it-IT" smtClean="0"/>
               <a:pPr/>
-              <a:t>27/12/2012</a:t>
+              <a:t>30/12/2012</a:t>
             </a:fld>
             <a:endParaRPr lang="it-IT"/>
           </a:p>
@@ -4747,7 +4877,7 @@
             <a:fld id="{63CABBC0-75E4-43BB-A6A6-84C2A96BDB82}" type="datetimeFigureOut">
               <a:rPr lang="it-IT" smtClean="0"/>
               <a:pPr/>
-              <a:t>27/12/2012</a:t>
+              <a:t>30/12/2012</a:t>
             </a:fld>
             <a:endParaRPr lang="it-IT"/>
           </a:p>
@@ -5430,14 +5560,14 @@
           <p:nvPr>
             <p:extLst>
               <p:ext uri="{D42A27DB-BD31-4B8C-83A1-F6EECF244321}">
-                <p14:modId xmlns="" xmlns:p14="http://schemas.microsoft.com/office/powerpoint/2010/main" val="3478576524"/>
+                <p14:modId xmlns:p14="http://schemas.microsoft.com/office/powerpoint/2010/main" xmlns="" val="3478576524"/>
               </p:ext>
             </p:extLst>
           </p:nvPr>
         </p:nvGraphicFramePr>
         <p:xfrm>
-          <a:off x="29313" y="4572009"/>
-          <a:ext cx="2051720" cy="2377440"/>
+          <a:off x="179512" y="5517232"/>
+          <a:ext cx="2051720" cy="1188720"/>
         </p:xfrm>
         <a:graphic>
           <a:graphicData uri="http://schemas.openxmlformats.org/drawingml/2006/table">
@@ -5500,7 +5630,13 @@
                         <a:rPr lang="it-IT" sz="1400" dirty="0" smtClean="0">
                           <a:effectLst/>
                         </a:rPr>
-                        <a:t>..</a:t>
+                        <a:t>Luca Di</a:t>
+                      </a:r>
+                      <a:r>
+                        <a:rPr lang="it-IT" sz="1400" baseline="0" dirty="0" smtClean="0">
+                          <a:effectLst/>
+                        </a:rPr>
+                        <a:t> Costanzo</a:t>
                       </a:r>
                       <a:endParaRPr lang="it-IT" sz="1400" dirty="0">
                         <a:effectLst/>
@@ -5525,82 +5661,13 @@
                         <a:rPr lang="it-IT" sz="1400" dirty="0" smtClean="0">
                           <a:effectLst/>
                         </a:rPr>
-                        <a:t>..</a:t>
+                        <a:t>&lt;matricola</a:t>
                       </a:r>
-                      <a:endParaRPr lang="it-IT" sz="1400" dirty="0">
-                        <a:effectLst/>
-                      </a:endParaRPr>
-                    </a:p>
-                  </a:txBody>
-                  <a:tcPr marL="38100" marR="38100" marT="38100" marB="38100"/>
-                </a:tc>
-              </a:tr>
-              <a:tr h="381373">
-                <a:tc>
-                  <a:txBody>
-                    <a:bodyPr/>
-                    <a:lstStyle/>
-                    <a:p>
-                      <a:pPr algn="ctr" rtl="0">
-                        <a:lnSpc>
-                          <a:spcPct val="150000"/>
-                        </a:lnSpc>
-                      </a:pPr>
                       <a:r>
-                        <a:rPr lang="it-IT" sz="1400" dirty="0" smtClean="0">
+                        <a:rPr lang="it-IT" sz="1400" baseline="0" dirty="0" smtClean="0">
                           <a:effectLst/>
                         </a:rPr>
-                        <a:t>..</a:t>
-                      </a:r>
-                      <a:endParaRPr lang="it-IT" sz="1400" dirty="0">
-                        <a:effectLst/>
-                      </a:endParaRPr>
-                    </a:p>
-                  </a:txBody>
-                  <a:tcPr marL="38100" marR="38100" marT="38100" marB="38100"/>
-                </a:tc>
-              </a:tr>
-              <a:tr h="381373">
-                <a:tc>
-                  <a:txBody>
-                    <a:bodyPr/>
-                    <a:lstStyle/>
-                    <a:p>
-                      <a:pPr algn="ctr" rtl="0">
-                        <a:lnSpc>
-                          <a:spcPct val="150000"/>
-                        </a:lnSpc>
-                      </a:pPr>
-                      <a:r>
-                        <a:rPr lang="it-IT" sz="1400" dirty="0" smtClean="0">
-                          <a:effectLst/>
-                        </a:rPr>
-                        <a:t>..</a:t>
-                      </a:r>
-                      <a:endParaRPr lang="it-IT" sz="1400" dirty="0">
-                        <a:effectLst/>
-                      </a:endParaRPr>
-                    </a:p>
-                  </a:txBody>
-                  <a:tcPr marL="38100" marR="38100" marT="38100" marB="38100"/>
-                </a:tc>
-              </a:tr>
-              <a:tr h="365319">
-                <a:tc>
-                  <a:txBody>
-                    <a:bodyPr/>
-                    <a:lstStyle/>
-                    <a:p>
-                      <a:pPr algn="ctr" rtl="0">
-                        <a:lnSpc>
-                          <a:spcPct val="150000"/>
-                        </a:lnSpc>
-                      </a:pPr>
-                      <a:r>
-                        <a:rPr lang="it-IT" sz="1400" dirty="0" smtClean="0">
-                          <a:effectLst/>
-                        </a:rPr>
-                        <a:t>..</a:t>
+                        <a:t> qui&gt;</a:t>
                       </a:r>
                       <a:endParaRPr lang="it-IT" sz="1400" dirty="0">
                         <a:effectLst/>
@@ -5623,13 +5690,13 @@
           <p:nvPr>
             <p:extLst>
               <p:ext uri="{D42A27DB-BD31-4B8C-83A1-F6EECF244321}">
-                <p14:modId xmlns="" xmlns:p14="http://schemas.microsoft.com/office/powerpoint/2010/main" val="3696521689"/>
+                <p14:modId xmlns:p14="http://schemas.microsoft.com/office/powerpoint/2010/main" xmlns="" val="3696521689"/>
               </p:ext>
             </p:extLst>
           </p:nvPr>
         </p:nvGraphicFramePr>
         <p:xfrm>
-          <a:off x="7092280" y="6060793"/>
+          <a:off x="6948264" y="5877272"/>
           <a:ext cx="2051720" cy="792480"/>
         </p:xfrm>
         <a:graphic>
@@ -5710,10 +5777,10 @@
           <p:nvPr/>
         </p:nvPicPr>
         <p:blipFill>
-          <a:blip r:embed="rId3">
+          <a:blip r:embed="rId3" cstate="print">
             <a:extLst>
               <a:ext uri="{28A0092B-C50C-407E-A947-70E740481C1C}">
-                <a14:useLocalDpi xmlns="" xmlns:a14="http://schemas.microsoft.com/office/drawing/2010/main" val="0"/>
+                <a14:useLocalDpi xmlns:a14="http://schemas.microsoft.com/office/drawing/2010/main" xmlns="" val="0"/>
               </a:ext>
             </a:extLst>
           </a:blip>
@@ -5733,7 +5800,7 @@
           <a:noFill/>
           <a:extLst>
             <a:ext uri="{909E8E84-426E-40DD-AFC4-6F175D3DCCD1}">
-              <a14:hiddenFill xmlns="" xmlns:a14="http://schemas.microsoft.com/office/drawing/2010/main">
+              <a14:hiddenFill xmlns:a14="http://schemas.microsoft.com/office/drawing/2010/main" xmlns="">
                 <a:solidFill>
                   <a:srgbClr val="FFFFFF"/>
                 </a:solidFill>
@@ -5745,7 +5812,7 @@
     </p:spTree>
     <p:extLst>
       <p:ext uri="{BB962C8B-B14F-4D97-AF65-F5344CB8AC3E}">
-        <p14:creationId xmlns="" xmlns:p14="http://schemas.microsoft.com/office/powerpoint/2010/main" val="4165334171"/>
+        <p14:creationId xmlns:p14="http://schemas.microsoft.com/office/powerpoint/2010/main" xmlns="" val="4165334171"/>
       </p:ext>
     </p:extLst>
   </p:cSld>
@@ -5806,7 +5873,6 @@
               <a:rPr lang="it-IT" sz="4800" b="1" dirty="0" smtClean="0"/>
               <a:t>Gestione Eventi</a:t>
             </a:r>
-            <a:endParaRPr lang="it-IT" sz="4800" b="1" dirty="0" smtClean="0"/>
           </a:p>
           <a:p>
             <a:pPr algn="ctr"/>
@@ -5816,9 +5882,6 @@
               </a:rPr>
               <a:t>Modifica Evento</a:t>
             </a:r>
-            <a:endParaRPr lang="it-IT" sz="2800" b="1" dirty="0" smtClean="0">
-              <a:latin typeface="+mj-lt"/>
-            </a:endParaRPr>
           </a:p>
           <a:p>
             <a:pPr algn="ctr"/>
@@ -5854,7 +5917,6 @@
               <a:rPr lang="it-IT" sz="2400" dirty="0" smtClean="0"/>
               <a:t>E’ possibile modificare solo un evento creato dalla stessa persona che vuole effettuare la modifica. </a:t>
             </a:r>
-            <a:endParaRPr lang="it-IT" sz="2400" dirty="0" smtClean="0"/>
           </a:p>
         </p:txBody>
       </p:sp>
@@ -5867,7 +5929,7 @@
           <p:nvPr/>
         </p:nvPicPr>
         <p:blipFill>
-          <a:blip r:embed="rId3"/>
+          <a:blip r:embed="rId3" cstate="print"/>
           <a:srcRect/>
           <a:stretch>
             <a:fillRect/>
@@ -5887,7 +5949,7 @@
     </p:spTree>
     <p:extLst>
       <p:ext uri="{BB962C8B-B14F-4D97-AF65-F5344CB8AC3E}">
-        <p14:creationId xmlns="" xmlns:p14="http://schemas.microsoft.com/office/powerpoint/2010/main" val="155874689"/>
+        <p14:creationId xmlns:p14="http://schemas.microsoft.com/office/powerpoint/2010/main" xmlns="" val="155874689"/>
       </p:ext>
     </p:extLst>
   </p:cSld>
@@ -5895,7 +5957,7 @@
     <a:masterClrMapping/>
   </p:clrMapOvr>
   <mc:AlternateContent xmlns:mc="http://schemas.openxmlformats.org/markup-compatibility/2006">
-    <mc:Choice xmlns="" xmlns:p14="http://schemas.microsoft.com/office/powerpoint/2010/main" Requires="p14">
+    <mc:Choice xmlns:p14="http://schemas.microsoft.com/office/powerpoint/2010/main" xmlns="" Requires="p14">
       <p:transition spd="slow" p14:dur="2000"/>
     </mc:Choice>
     <mc:Fallback>
@@ -5956,7 +6018,6 @@
               <a:rPr lang="it-IT" sz="4800" b="1" dirty="0" smtClean="0"/>
               <a:t>Gestione Eventi</a:t>
             </a:r>
-            <a:endParaRPr lang="it-IT" sz="4800" b="1" dirty="0" smtClean="0"/>
           </a:p>
           <a:p>
             <a:pPr algn="ctr"/>
@@ -5964,17 +6025,8 @@
               <a:rPr lang="it-IT" sz="2800" b="1" dirty="0" smtClean="0">
                 <a:latin typeface="+mj-lt"/>
               </a:rPr>
-              <a:t>Rimozione </a:t>
-            </a:r>
-            <a:r>
-              <a:rPr lang="it-IT" sz="2800" b="1" dirty="0" smtClean="0">
-                <a:latin typeface="+mj-lt"/>
-              </a:rPr>
-              <a:t>Evento</a:t>
-            </a:r>
-            <a:endParaRPr lang="it-IT" sz="2800" b="1" dirty="0" smtClean="0">
-              <a:latin typeface="+mj-lt"/>
-            </a:endParaRPr>
+              <a:t>Rimozione Evento</a:t>
+            </a:r>
           </a:p>
           <a:p>
             <a:pPr algn="ctr"/>
@@ -6010,7 +6062,6 @@
               <a:rPr lang="it-IT" sz="2400" dirty="0" smtClean="0"/>
               <a:t>E’ possibile cancellare un evento. Per farlo bisogna essere l’autore dell’evento che decidiamo di eliminare.</a:t>
             </a:r>
-            <a:endParaRPr lang="it-IT" sz="2400" dirty="0" smtClean="0"/>
           </a:p>
         </p:txBody>
       </p:sp>
@@ -6043,7 +6094,7 @@
     </p:spTree>
     <p:extLst>
       <p:ext uri="{BB962C8B-B14F-4D97-AF65-F5344CB8AC3E}">
-        <p14:creationId xmlns="" xmlns:p14="http://schemas.microsoft.com/office/powerpoint/2010/main" val="155874689"/>
+        <p14:creationId xmlns:p14="http://schemas.microsoft.com/office/powerpoint/2010/main" xmlns="" val="155874689"/>
       </p:ext>
     </p:extLst>
   </p:cSld>
@@ -6051,7 +6102,7 @@
     <a:masterClrMapping/>
   </p:clrMapOvr>
   <mc:AlternateContent xmlns:mc="http://schemas.openxmlformats.org/markup-compatibility/2006">
-    <mc:Choice xmlns="" xmlns:p14="http://schemas.microsoft.com/office/powerpoint/2010/main" Requires="p14">
+    <mc:Choice xmlns:p14="http://schemas.microsoft.com/office/powerpoint/2010/main" xmlns="" Requires="p14">
       <p:transition spd="slow" p14:dur="2000"/>
     </mc:Choice>
     <mc:Fallback>
@@ -6112,7 +6163,6 @@
               <a:rPr lang="it-IT" sz="4800" b="1" dirty="0" smtClean="0"/>
               <a:t>Gestione Eventi</a:t>
             </a:r>
-            <a:endParaRPr lang="it-IT" sz="4800" b="1" dirty="0" smtClean="0"/>
           </a:p>
           <a:p>
             <a:pPr algn="ctr"/>
@@ -6122,9 +6172,6 @@
               </a:rPr>
               <a:t>Singleton Pattern</a:t>
             </a:r>
-            <a:endParaRPr lang="it-IT" sz="2800" b="1" dirty="0" smtClean="0">
-              <a:latin typeface="+mj-lt"/>
-            </a:endParaRPr>
           </a:p>
           <a:p>
             <a:pPr algn="ctr"/>
@@ -6179,7 +6226,6 @@
               <a:rPr lang="it-IT" sz="2400" dirty="0" smtClean="0"/>
               <a:t> permette di realizzare una sola istanza di una determinata classe fornendo un punto d’accesso globale a tale istanza.</a:t>
             </a:r>
-            <a:endParaRPr lang="it-IT" sz="2400" dirty="0" smtClean="0"/>
           </a:p>
         </p:txBody>
       </p:sp>
@@ -6192,7 +6238,7 @@
           <p:nvPr/>
         </p:nvPicPr>
         <p:blipFill>
-          <a:blip r:embed="rId3"/>
+          <a:blip r:embed="rId3" cstate="print"/>
           <a:srcRect/>
           <a:stretch>
             <a:fillRect/>
@@ -6218,7 +6264,7 @@
           <p:nvPr/>
         </p:nvPicPr>
         <p:blipFill>
-          <a:blip r:embed="rId4"/>
+          <a:blip r:embed="rId4" cstate="print"/>
           <a:srcRect/>
           <a:stretch>
             <a:fillRect/>
@@ -6238,7 +6284,7 @@
     </p:spTree>
     <p:extLst>
       <p:ext uri="{BB962C8B-B14F-4D97-AF65-F5344CB8AC3E}">
-        <p14:creationId xmlns="" xmlns:p14="http://schemas.microsoft.com/office/powerpoint/2010/main" val="155874689"/>
+        <p14:creationId xmlns:p14="http://schemas.microsoft.com/office/powerpoint/2010/main" xmlns="" val="155874689"/>
       </p:ext>
     </p:extLst>
   </p:cSld>
@@ -6246,7 +6292,7 @@
     <a:masterClrMapping/>
   </p:clrMapOvr>
   <mc:AlternateContent xmlns:mc="http://schemas.openxmlformats.org/markup-compatibility/2006">
-    <mc:Choice xmlns="" xmlns:p14="http://schemas.microsoft.com/office/powerpoint/2010/main" Requires="p14">
+    <mc:Choice xmlns:p14="http://schemas.microsoft.com/office/powerpoint/2010/main" xmlns="" Requires="p14">
       <p:transition spd="slow" p14:dur="2000"/>
     </mc:Choice>
     <mc:Fallback>
@@ -6521,7 +6567,7 @@
     </p:spTree>
     <p:extLst>
       <p:ext uri="{BB962C8B-B14F-4D97-AF65-F5344CB8AC3E}">
-        <p14:creationId xmlns="" xmlns:p14="http://schemas.microsoft.com/office/powerpoint/2010/main" val="155874689"/>
+        <p14:creationId xmlns:p14="http://schemas.microsoft.com/office/powerpoint/2010/main" xmlns="" val="155874689"/>
       </p:ext>
     </p:extLst>
   </p:cSld>
@@ -6529,7 +6575,7 @@
     <a:masterClrMapping/>
   </p:clrMapOvr>
   <mc:AlternateContent xmlns:mc="http://schemas.openxmlformats.org/markup-compatibility/2006">
-    <mc:Choice xmlns="" xmlns:p14="http://schemas.microsoft.com/office/powerpoint/2010/main" Requires="p14">
+    <mc:Choice xmlns:p14="http://schemas.microsoft.com/office/powerpoint/2010/main" xmlns="" Requires="p14">
       <p:transition spd="slow" p14:dur="2000"/>
     </mc:Choice>
     <mc:Fallback>
@@ -6877,7 +6923,7 @@
     </p:spTree>
     <p:extLst>
       <p:ext uri="{BB962C8B-B14F-4D97-AF65-F5344CB8AC3E}">
-        <p14:creationId xmlns="" xmlns:p14="http://schemas.microsoft.com/office/powerpoint/2010/main" val="155874689"/>
+        <p14:creationId xmlns:p14="http://schemas.microsoft.com/office/powerpoint/2010/main" xmlns="" val="155874689"/>
       </p:ext>
     </p:extLst>
   </p:cSld>
@@ -6885,7 +6931,7 @@
     <a:masterClrMapping/>
   </p:clrMapOvr>
   <mc:AlternateContent xmlns:mc="http://schemas.openxmlformats.org/markup-compatibility/2006">
-    <mc:Choice xmlns="" xmlns:p14="http://schemas.microsoft.com/office/powerpoint/2010/main" Requires="p14">
+    <mc:Choice xmlns:p14="http://schemas.microsoft.com/office/powerpoint/2010/main" xmlns="" Requires="p14">
       <p:transition spd="slow" p14:dur="2000"/>
     </mc:Choice>
     <mc:Fallback>
@@ -7218,7 +7264,7 @@
           <p:nvPr/>
         </p:nvPicPr>
         <p:blipFill>
-          <a:blip r:embed="rId3"/>
+          <a:blip r:embed="rId3" cstate="print"/>
           <a:srcRect/>
           <a:stretch>
             <a:fillRect/>
@@ -7238,7 +7284,7 @@
     </p:spTree>
     <p:extLst>
       <p:ext uri="{BB962C8B-B14F-4D97-AF65-F5344CB8AC3E}">
-        <p14:creationId xmlns="" xmlns:p14="http://schemas.microsoft.com/office/powerpoint/2010/main" val="155874689"/>
+        <p14:creationId xmlns:p14="http://schemas.microsoft.com/office/powerpoint/2010/main" xmlns="" val="155874689"/>
       </p:ext>
     </p:extLst>
   </p:cSld>
@@ -7246,7 +7292,7 @@
     <a:masterClrMapping/>
   </p:clrMapOvr>
   <mc:AlternateContent xmlns:mc="http://schemas.openxmlformats.org/markup-compatibility/2006">
-    <mc:Choice xmlns="" xmlns:p14="http://schemas.microsoft.com/office/powerpoint/2010/main" Requires="p14">
+    <mc:Choice xmlns:p14="http://schemas.microsoft.com/office/powerpoint/2010/main" xmlns="" Requires="p14">
       <p:transition spd="slow" p14:dur="2000"/>
     </mc:Choice>
     <mc:Fallback>
@@ -7363,7 +7409,7 @@
           <p:nvPr/>
         </p:nvPicPr>
         <p:blipFill>
-          <a:blip r:embed="rId3"/>
+          <a:blip r:embed="rId3" cstate="print"/>
           <a:srcRect/>
           <a:stretch>
             <a:fillRect/>
@@ -7383,7 +7429,7 @@
     </p:spTree>
     <p:extLst>
       <p:ext uri="{BB962C8B-B14F-4D97-AF65-F5344CB8AC3E}">
-        <p14:creationId xmlns="" xmlns:p14="http://schemas.microsoft.com/office/powerpoint/2010/main" val="155874689"/>
+        <p14:creationId xmlns:p14="http://schemas.microsoft.com/office/powerpoint/2010/main" xmlns="" val="155874689"/>
       </p:ext>
     </p:extLst>
   </p:cSld>
@@ -7391,7 +7437,7 @@
     <a:masterClrMapping/>
   </p:clrMapOvr>
   <mc:AlternateContent xmlns:mc="http://schemas.openxmlformats.org/markup-compatibility/2006">
-    <mc:Choice xmlns="" xmlns:p14="http://schemas.microsoft.com/office/powerpoint/2010/main" Requires="p14">
+    <mc:Choice xmlns:p14="http://schemas.microsoft.com/office/powerpoint/2010/main" xmlns="" Requires="p14">
       <p:transition spd="slow" p14:dur="2000"/>
     </mc:Choice>
     <mc:Fallback>
@@ -7452,7 +7498,6 @@
               <a:rPr lang="it-IT" sz="4800" b="1" dirty="0" smtClean="0"/>
               <a:t>Gestione Eventi</a:t>
             </a:r>
-            <a:endParaRPr lang="it-IT" sz="4800" b="1" dirty="0" smtClean="0"/>
           </a:p>
           <a:p>
             <a:pPr algn="ctr"/>
@@ -7488,7 +7533,6 @@
               <a:rPr lang="it-IT" sz="2600" dirty="0" smtClean="0"/>
               <a:t>Il nostro sistema permette di gestire gli eventi che coinvolgono gli iscritti all’asilo.</a:t>
             </a:r>
-            <a:endParaRPr lang="it-IT" sz="2600" dirty="0" smtClean="0"/>
           </a:p>
           <a:p>
             <a:pPr algn="just"/>
@@ -7496,7 +7540,6 @@
               <a:rPr lang="it-IT" sz="2600" dirty="0" smtClean="0"/>
               <a:t>Alcune delle possibili operazioni sono :</a:t>
             </a:r>
-            <a:endParaRPr lang="it-IT" sz="2600" dirty="0" smtClean="0"/>
           </a:p>
         </p:txBody>
       </p:sp>
@@ -7692,7 +7735,6 @@
               <a:rPr lang="it-IT" dirty="0" smtClean="0"/>
               <a:t>Inserimento Eventi</a:t>
             </a:r>
-            <a:endParaRPr lang="it-IT" dirty="0" smtClean="0"/>
           </a:p>
           <a:p>
             <a:pPr lvl="1"/>
@@ -7700,7 +7742,6 @@
               <a:rPr lang="it-IT" dirty="0" smtClean="0"/>
               <a:t>Modifica Eventi</a:t>
             </a:r>
-            <a:endParaRPr lang="it-IT" dirty="0" smtClean="0"/>
           </a:p>
           <a:p>
             <a:pPr lvl="1"/>
@@ -7708,14 +7749,13 @@
               <a:rPr lang="it-IT" dirty="0" smtClean="0"/>
               <a:t>Rimozione Eventi</a:t>
             </a:r>
-            <a:endParaRPr lang="it-IT" dirty="0" smtClean="0"/>
           </a:p>
         </p:txBody>
       </p:sp>
     </p:spTree>
     <p:extLst>
       <p:ext uri="{BB962C8B-B14F-4D97-AF65-F5344CB8AC3E}">
-        <p14:creationId xmlns="" xmlns:p14="http://schemas.microsoft.com/office/powerpoint/2010/main" val="155874689"/>
+        <p14:creationId xmlns:p14="http://schemas.microsoft.com/office/powerpoint/2010/main" xmlns="" val="155874689"/>
       </p:ext>
     </p:extLst>
   </p:cSld>
@@ -7723,7 +7763,7 @@
     <a:masterClrMapping/>
   </p:clrMapOvr>
   <mc:AlternateContent xmlns:mc="http://schemas.openxmlformats.org/markup-compatibility/2006">
-    <mc:Choice xmlns="" xmlns:p14="http://schemas.microsoft.com/office/powerpoint/2010/main" Requires="p14">
+    <mc:Choice xmlns:p14="http://schemas.microsoft.com/office/powerpoint/2010/main" xmlns="" Requires="p14">
       <p:transition spd="slow" p14:dur="2000"/>
     </mc:Choice>
     <mc:Fallback>
@@ -7784,7 +7824,6 @@
               <a:rPr lang="it-IT" sz="4800" b="1" dirty="0" smtClean="0"/>
               <a:t>Gestione Eventi</a:t>
             </a:r>
-            <a:endParaRPr lang="it-IT" sz="4800" b="1" dirty="0" smtClean="0"/>
           </a:p>
           <a:p>
             <a:pPr algn="ctr"/>
@@ -7803,7 +7842,7 @@
           <p:nvPr/>
         </p:nvPicPr>
         <p:blipFill>
-          <a:blip r:embed="rId3"/>
+          <a:blip r:embed="rId3" cstate="print"/>
           <a:srcRect/>
           <a:stretch>
             <a:fillRect/>
@@ -7823,7 +7862,7 @@
     </p:spTree>
     <p:extLst>
       <p:ext uri="{BB962C8B-B14F-4D97-AF65-F5344CB8AC3E}">
-        <p14:creationId xmlns="" xmlns:p14="http://schemas.microsoft.com/office/powerpoint/2010/main" val="155874689"/>
+        <p14:creationId xmlns:p14="http://schemas.microsoft.com/office/powerpoint/2010/main" xmlns="" val="155874689"/>
       </p:ext>
     </p:extLst>
   </p:cSld>
@@ -7831,7 +7870,7 @@
     <a:masterClrMapping/>
   </p:clrMapOvr>
   <mc:AlternateContent xmlns:mc="http://schemas.openxmlformats.org/markup-compatibility/2006">
-    <mc:Choice xmlns="" xmlns:p14="http://schemas.microsoft.com/office/powerpoint/2010/main" Requires="p14">
+    <mc:Choice xmlns:p14="http://schemas.microsoft.com/office/powerpoint/2010/main" xmlns="" Requires="p14">
       <p:transition spd="slow" p14:dur="2000"/>
     </mc:Choice>
     <mc:Fallback>
@@ -7892,7 +7931,6 @@
               <a:rPr lang="it-IT" sz="4800" b="1" dirty="0" smtClean="0"/>
               <a:t>Gestione Eventi</a:t>
             </a:r>
-            <a:endParaRPr lang="it-IT" sz="4800" b="1" dirty="0" smtClean="0"/>
           </a:p>
           <a:p>
             <a:pPr algn="ctr"/>
@@ -7902,9 +7940,6 @@
               </a:rPr>
               <a:t>Visualizzazione Evento</a:t>
             </a:r>
-            <a:endParaRPr lang="it-IT" sz="2800" b="1" dirty="0" smtClean="0">
-              <a:latin typeface="+mj-lt"/>
-            </a:endParaRPr>
           </a:p>
           <a:p>
             <a:pPr algn="ctr"/>
@@ -7940,7 +7975,6 @@
               <a:rPr lang="it-IT" sz="2400" dirty="0" smtClean="0"/>
               <a:t>Selezionando un giorno dal calendario è possibile visualizzare tutti gli eventi per quella specifica data.</a:t>
             </a:r>
-            <a:endParaRPr lang="it-IT" sz="2400" dirty="0" smtClean="0"/>
           </a:p>
         </p:txBody>
       </p:sp>
@@ -7953,7 +7987,7 @@
           <p:nvPr/>
         </p:nvPicPr>
         <p:blipFill>
-          <a:blip r:embed="rId3"/>
+          <a:blip r:embed="rId3" cstate="print"/>
           <a:srcRect/>
           <a:stretch>
             <a:fillRect/>
@@ -7999,7 +8033,7 @@
     </p:spTree>
     <p:extLst>
       <p:ext uri="{BB962C8B-B14F-4D97-AF65-F5344CB8AC3E}">
-        <p14:creationId xmlns="" xmlns:p14="http://schemas.microsoft.com/office/powerpoint/2010/main" val="155874689"/>
+        <p14:creationId xmlns:p14="http://schemas.microsoft.com/office/powerpoint/2010/main" xmlns="" val="155874689"/>
       </p:ext>
     </p:extLst>
   </p:cSld>
@@ -8007,7 +8041,7 @@
     <a:masterClrMapping/>
   </p:clrMapOvr>
   <mc:AlternateContent xmlns:mc="http://schemas.openxmlformats.org/markup-compatibility/2006">
-    <mc:Choice xmlns="" xmlns:p14="http://schemas.microsoft.com/office/powerpoint/2010/main" Requires="p14">
+    <mc:Choice xmlns:p14="http://schemas.microsoft.com/office/powerpoint/2010/main" xmlns="" Requires="p14">
       <p:transition spd="slow" p14:dur="2000"/>
     </mc:Choice>
     <mc:Fallback>
@@ -8068,7 +8102,6 @@
               <a:rPr lang="it-IT" sz="4800" b="1" dirty="0" smtClean="0"/>
               <a:t>Gestione Eventi</a:t>
             </a:r>
-            <a:endParaRPr lang="it-IT" sz="4800" b="1" dirty="0" smtClean="0"/>
           </a:p>
           <a:p>
             <a:pPr algn="ctr"/>
@@ -8078,9 +8111,6 @@
               </a:rPr>
               <a:t>Inserimento Evento</a:t>
             </a:r>
-            <a:endParaRPr lang="it-IT" sz="2800" b="1" dirty="0" smtClean="0">
-              <a:latin typeface="+mj-lt"/>
-            </a:endParaRPr>
           </a:p>
           <a:p>
             <a:pPr algn="ctr"/>
@@ -8124,7 +8154,6 @@
               <a:rPr lang="it-IT" sz="2400" dirty="0" smtClean="0"/>
               <a:t>. E’ possibile allegare un file contenente il programma dell’evento.</a:t>
             </a:r>
-            <a:endParaRPr lang="it-IT" sz="2400" dirty="0" smtClean="0"/>
           </a:p>
         </p:txBody>
       </p:sp>
@@ -8137,7 +8166,7 @@
           <p:nvPr/>
         </p:nvPicPr>
         <p:blipFill>
-          <a:blip r:embed="rId3"/>
+          <a:blip r:embed="rId3" cstate="print"/>
           <a:srcRect/>
           <a:stretch>
             <a:fillRect/>
@@ -8157,7 +8186,7 @@
     </p:spTree>
     <p:extLst>
       <p:ext uri="{BB962C8B-B14F-4D97-AF65-F5344CB8AC3E}">
-        <p14:creationId xmlns="" xmlns:p14="http://schemas.microsoft.com/office/powerpoint/2010/main" val="155874689"/>
+        <p14:creationId xmlns:p14="http://schemas.microsoft.com/office/powerpoint/2010/main" xmlns="" val="155874689"/>
       </p:ext>
     </p:extLst>
   </p:cSld>
@@ -8165,7 +8194,7 @@
     <a:masterClrMapping/>
   </p:clrMapOvr>
   <mc:AlternateContent xmlns:mc="http://schemas.openxmlformats.org/markup-compatibility/2006">
-    <mc:Choice xmlns="" xmlns:p14="http://schemas.microsoft.com/office/powerpoint/2010/main" Requires="p14">
+    <mc:Choice xmlns:p14="http://schemas.microsoft.com/office/powerpoint/2010/main" xmlns="" Requires="p14">
       <p:transition spd="slow" p14:dur="2000"/>
     </mc:Choice>
     <mc:Fallback>

</xml_diff>

<commit_message>
[wt m] aggiunta animazione
</commit_message>
<xml_diff>
--- a/Presentazione/Atsilo2/Luca/Luca_PresentazioneFinale.pptx
+++ b/Presentazione/Atsilo2/Luca/Luca_PresentazioneFinale.pptx
@@ -453,7 +453,7 @@
     </p:spTree>
     <p:extLst>
       <p:ext uri="{BB962C8B-B14F-4D97-AF65-F5344CB8AC3E}">
-        <p14:creationId xmlns:p14="http://schemas.microsoft.com/office/powerpoint/2010/main" xmlns="" val="2126419590"/>
+        <p14:creationId xmlns="" xmlns:p14="http://schemas.microsoft.com/office/powerpoint/2010/main" val="2126419590"/>
       </p:ext>
     </p:extLst>
   </p:cSld>
@@ -5583,7 +5583,7 @@
     </p:spTree>
     <p:extLst>
       <p:ext uri="{BB962C8B-B14F-4D97-AF65-F5344CB8AC3E}">
-        <p14:creationId xmlns:p14="http://schemas.microsoft.com/office/powerpoint/2010/main" xmlns="" val="155874689"/>
+        <p14:creationId xmlns="" xmlns:p14="http://schemas.microsoft.com/office/powerpoint/2010/main" val="155874689"/>
       </p:ext>
     </p:extLst>
   </p:cSld>
@@ -5591,7 +5591,7 @@
     <a:masterClrMapping/>
   </p:clrMapOvr>
   <mc:AlternateContent xmlns:mc="http://schemas.openxmlformats.org/markup-compatibility/2006">
-    <mc:Choice xmlns:p14="http://schemas.microsoft.com/office/powerpoint/2010/main" xmlns="" Requires="p14">
+    <mc:Choice xmlns="" xmlns:p14="http://schemas.microsoft.com/office/powerpoint/2010/main" Requires="p14">
       <p:transition spd="slow" p14:dur="2000"/>
     </mc:Choice>
     <mc:Fallback>
@@ -5755,7 +5755,7 @@
     </p:spTree>
     <p:extLst>
       <p:ext uri="{BB962C8B-B14F-4D97-AF65-F5344CB8AC3E}">
-        <p14:creationId xmlns="" xmlns:p14="http://schemas.microsoft.com/office/powerpoint/2010/main" val="155874689"/>
+        <p14:creationId xmlns:p14="http://schemas.microsoft.com/office/powerpoint/2010/main" xmlns="" val="155874689"/>
       </p:ext>
     </p:extLst>
   </p:cSld>
@@ -5763,7 +5763,7 @@
     <a:masterClrMapping/>
   </p:clrMapOvr>
   <mc:AlternateContent xmlns:mc="http://schemas.openxmlformats.org/markup-compatibility/2006">
-    <mc:Choice xmlns="" xmlns:p14="http://schemas.microsoft.com/office/powerpoint/2010/main" Requires="p14">
+    <mc:Choice xmlns:p14="http://schemas.microsoft.com/office/powerpoint/2010/main" xmlns="" Requires="p14">
       <p:transition spd="slow" p14:dur="2000"/>
     </mc:Choice>
     <mc:Fallback>
@@ -5945,7 +5945,7 @@
     </p:spTree>
     <p:extLst>
       <p:ext uri="{BB962C8B-B14F-4D97-AF65-F5344CB8AC3E}">
-        <p14:creationId xmlns:p14="http://schemas.microsoft.com/office/powerpoint/2010/main" xmlns="" val="155874689"/>
+        <p14:creationId xmlns="" xmlns:p14="http://schemas.microsoft.com/office/powerpoint/2010/main" val="155874689"/>
       </p:ext>
     </p:extLst>
   </p:cSld>
@@ -5953,7 +5953,7 @@
     <a:masterClrMapping/>
   </p:clrMapOvr>
   <mc:AlternateContent xmlns:mc="http://schemas.openxmlformats.org/markup-compatibility/2006">
-    <mc:Choice xmlns:p14="http://schemas.microsoft.com/office/powerpoint/2010/main" xmlns="" Requires="p14">
+    <mc:Choice xmlns="" xmlns:p14="http://schemas.microsoft.com/office/powerpoint/2010/main" Requires="p14">
       <p:transition spd="slow" p14:dur="2000"/>
     </mc:Choice>
     <mc:Fallback>
@@ -6246,11 +6246,7 @@
             <a:pPr lvl="1"/>
             <a:r>
               <a:rPr lang="it-IT" dirty="0" smtClean="0"/>
-              <a:t>Gestione </a:t>
-            </a:r>
-            <a:r>
-              <a:rPr lang="it-IT" dirty="0" smtClean="0"/>
-              <a:t>dei pagamenti </a:t>
+              <a:t>Gestione dei pagamenti </a:t>
             </a:r>
           </a:p>
         </p:txBody>
@@ -6284,7 +6280,7 @@
     </p:spTree>
     <p:extLst>
       <p:ext uri="{BB962C8B-B14F-4D97-AF65-F5344CB8AC3E}">
-        <p14:creationId xmlns:p14="http://schemas.microsoft.com/office/powerpoint/2010/main" xmlns="" val="155874689"/>
+        <p14:creationId xmlns="" xmlns:p14="http://schemas.microsoft.com/office/powerpoint/2010/main" val="155874689"/>
       </p:ext>
     </p:extLst>
   </p:cSld>
@@ -6292,7 +6288,7 @@
     <a:masterClrMapping/>
   </p:clrMapOvr>
   <mc:AlternateContent xmlns:mc="http://schemas.openxmlformats.org/markup-compatibility/2006">
-    <mc:Choice xmlns:p14="http://schemas.microsoft.com/office/powerpoint/2010/main" xmlns="" Requires="p14">
+    <mc:Choice xmlns="" xmlns:p14="http://schemas.microsoft.com/office/powerpoint/2010/main" Requires="p14">
       <p:transition spd="slow" p14:dur="2000"/>
     </mc:Choice>
     <mc:Fallback>
@@ -6590,11 +6586,7 @@
             <a:pPr lvl="1"/>
             <a:r>
               <a:rPr lang="it-IT" dirty="0" smtClean="0"/>
-              <a:t>Visualizzazione </a:t>
-            </a:r>
-            <a:r>
-              <a:rPr lang="it-IT" dirty="0" smtClean="0"/>
-              <a:t>graduatorie</a:t>
+              <a:t>Visualizzazione graduatorie</a:t>
             </a:r>
           </a:p>
           <a:p>
@@ -6635,7 +6627,7 @@
     </p:spTree>
     <p:extLst>
       <p:ext uri="{BB962C8B-B14F-4D97-AF65-F5344CB8AC3E}">
-        <p14:creationId xmlns:p14="http://schemas.microsoft.com/office/powerpoint/2010/main" xmlns="" val="155874689"/>
+        <p14:creationId xmlns="" xmlns:p14="http://schemas.microsoft.com/office/powerpoint/2010/main" val="155874689"/>
       </p:ext>
     </p:extLst>
   </p:cSld>
@@ -6643,7 +6635,7 @@
     <a:masterClrMapping/>
   </p:clrMapOvr>
   <mc:AlternateContent xmlns:mc="http://schemas.openxmlformats.org/markup-compatibility/2006">
-    <mc:Choice xmlns:p14="http://schemas.microsoft.com/office/powerpoint/2010/main" xmlns="" Requires="p14">
+    <mc:Choice xmlns="" xmlns:p14="http://schemas.microsoft.com/office/powerpoint/2010/main" Requires="p14">
       <p:transition spd="slow" p14:dur="2000"/>
     </mc:Choice>
     <mc:Fallback>
@@ -6780,7 +6772,7 @@
     </p:spTree>
     <p:extLst>
       <p:ext uri="{BB962C8B-B14F-4D97-AF65-F5344CB8AC3E}">
-        <p14:creationId xmlns:p14="http://schemas.microsoft.com/office/powerpoint/2010/main" xmlns="" val="155874689"/>
+        <p14:creationId xmlns="" xmlns:p14="http://schemas.microsoft.com/office/powerpoint/2010/main" val="155874689"/>
       </p:ext>
     </p:extLst>
   </p:cSld>
@@ -6788,7 +6780,7 @@
     <a:masterClrMapping/>
   </p:clrMapOvr>
   <mc:AlternateContent xmlns:mc="http://schemas.openxmlformats.org/markup-compatibility/2006">
-    <mc:Choice xmlns:p14="http://schemas.microsoft.com/office/powerpoint/2010/main" xmlns="" Requires="p14">
+    <mc:Choice xmlns="" xmlns:p14="http://schemas.microsoft.com/office/powerpoint/2010/main" Requires="p14">
       <p:transition spd="slow" p14:dur="2000"/>
     </mc:Choice>
     <mc:Fallback>
@@ -6882,20 +6874,15 @@
             <a:pPr algn="just"/>
             <a:r>
               <a:rPr lang="it-IT" sz="2600" dirty="0" smtClean="0"/>
-              <a:t>Il nostro sistema permette di gestire gli eventi che coinvolgono gli iscritti all’asilo</a:t>
-            </a:r>
-            <a:r>
-              <a:rPr lang="it-IT" sz="2600" dirty="0" smtClean="0"/>
-              <a:t>.</a:t>
-            </a:r>
-            <a:endParaRPr lang="it-IT" sz="2600" dirty="0" smtClean="0"/>
+              <a:t>Il nostro sistema permette di gestire gli eventi che coinvolgono gli iscritti all’asilo.</a:t>
+            </a:r>
           </a:p>
         </p:txBody>
       </p:sp>
     </p:spTree>
     <p:extLst>
       <p:ext uri="{BB962C8B-B14F-4D97-AF65-F5344CB8AC3E}">
-        <p14:creationId xmlns:p14="http://schemas.microsoft.com/office/powerpoint/2010/main" xmlns="" val="155874689"/>
+        <p14:creationId xmlns="" xmlns:p14="http://schemas.microsoft.com/office/powerpoint/2010/main" val="155874689"/>
       </p:ext>
     </p:extLst>
   </p:cSld>
@@ -6903,7 +6890,7 @@
     <a:masterClrMapping/>
   </p:clrMapOvr>
   <mc:AlternateContent xmlns:mc="http://schemas.openxmlformats.org/markup-compatibility/2006">
-    <mc:Choice xmlns:p14="http://schemas.microsoft.com/office/powerpoint/2010/main" xmlns="" Requires="p14">
+    <mc:Choice xmlns="" xmlns:p14="http://schemas.microsoft.com/office/powerpoint/2010/main" Requires="p14">
       <p:transition spd="slow" p14:dur="2000"/>
     </mc:Choice>
     <mc:Fallback>
@@ -7002,7 +6989,7 @@
     </p:spTree>
     <p:extLst>
       <p:ext uri="{BB962C8B-B14F-4D97-AF65-F5344CB8AC3E}">
-        <p14:creationId xmlns:p14="http://schemas.microsoft.com/office/powerpoint/2010/main" xmlns="" val="155874689"/>
+        <p14:creationId xmlns="" xmlns:p14="http://schemas.microsoft.com/office/powerpoint/2010/main" val="155874689"/>
       </p:ext>
     </p:extLst>
   </p:cSld>
@@ -7010,7 +6997,7 @@
     <a:masterClrMapping/>
   </p:clrMapOvr>
   <mc:AlternateContent xmlns:mc="http://schemas.openxmlformats.org/markup-compatibility/2006">
-    <mc:Choice xmlns:p14="http://schemas.microsoft.com/office/powerpoint/2010/main" xmlns="" Requires="p14">
+    <mc:Choice xmlns="" xmlns:p14="http://schemas.microsoft.com/office/powerpoint/2010/main" Requires="p14">
       <p:transition spd="slow" p14:dur="2000"/>
     </mc:Choice>
     <mc:Fallback>
@@ -7053,7 +7040,7 @@
           <p:nvPr/>
         </p:nvPicPr>
         <p:blipFill>
-          <a:blip r:embed="rId3"/>
+          <a:blip r:embed="rId3" cstate="print"/>
           <a:srcRect/>
           <a:stretch>
             <a:fillRect/>
@@ -7079,7 +7066,7 @@
         <p:spPr>
           <a:xfrm>
             <a:off x="785786" y="4643446"/>
-            <a:ext cx="8358214" cy="1938992"/>
+            <a:ext cx="8106694" cy="830997"/>
           </a:xfrm>
           <a:prstGeom prst="rect">
             <a:avLst/>
@@ -7105,13 +7092,36 @@
             </a:r>
             <a:r>
               <a:rPr lang="it-IT" sz="2400" dirty="0" smtClean="0"/>
-              <a:t>per la data selezionata</a:t>
-            </a:r>
-          </a:p>
-          <a:p>
-            <a:pPr algn="just"/>
+              <a:t>per la data </a:t>
+            </a:r>
+            <a:r>
+              <a:rPr lang="it-IT" sz="2400" dirty="0" smtClean="0"/>
+              <a:t>selezionata</a:t>
+            </a:r>
             <a:endParaRPr lang="it-IT" sz="2400" dirty="0" smtClean="0"/>
           </a:p>
+        </p:txBody>
+      </p:sp>
+      <p:sp>
+        <p:nvSpPr>
+          <p:cNvPr id="4" name="Rettangolo 3"/>
+          <p:cNvSpPr/>
+          <p:nvPr/>
+        </p:nvSpPr>
+        <p:spPr>
+          <a:xfrm>
+            <a:off x="785786" y="5661248"/>
+            <a:ext cx="7962678" cy="830997"/>
+          </a:xfrm>
+          <a:prstGeom prst="rect">
+            <a:avLst/>
+          </a:prstGeom>
+        </p:spPr>
+        <p:txBody>
+          <a:bodyPr wrap="square">
+            <a:spAutoFit/>
+          </a:bodyPr>
+          <a:lstStyle/>
           <a:p>
             <a:pPr algn="just">
               <a:buFont typeface="Wingdings" pitchFamily="2" charset="2"/>
@@ -7119,11 +7129,11 @@
             </a:pPr>
             <a:r>
               <a:rPr lang="it-IT" sz="2400" dirty="0" smtClean="0"/>
-              <a:t>L’utente </a:t>
+              <a:t>L’utente può </a:t>
             </a:r>
             <a:r>
               <a:rPr lang="it-IT" sz="2400" dirty="0" smtClean="0"/>
-              <a:t>può selezionare l’evento da modificare </a:t>
+              <a:t>selezionare l’evento da modificare </a:t>
             </a:r>
             <a:r>
               <a:rPr lang="it-IT" sz="2400" b="1" dirty="0" smtClean="0"/>
@@ -7131,20 +7141,15 @@
             </a:r>
             <a:r>
               <a:rPr lang="it-IT" sz="2400" dirty="0" smtClean="0"/>
-              <a:t> se ne è </a:t>
-            </a:r>
-            <a:r>
-              <a:rPr lang="it-IT" sz="2400" dirty="0" smtClean="0"/>
-              <a:t>l’autore</a:t>
-            </a:r>
-            <a:endParaRPr lang="it-IT" sz="2400" dirty="0" smtClean="0"/>
+              <a:t> se ne è l’autore</a:t>
+            </a:r>
           </a:p>
         </p:txBody>
       </p:sp>
     </p:spTree>
     <p:extLst>
       <p:ext uri="{BB962C8B-B14F-4D97-AF65-F5344CB8AC3E}">
-        <p14:creationId xmlns:p14="http://schemas.microsoft.com/office/powerpoint/2010/main" xmlns="" val="155874689"/>
+        <p14:creationId xmlns="" xmlns:p14="http://schemas.microsoft.com/office/powerpoint/2010/main" val="155874689"/>
       </p:ext>
     </p:extLst>
   </p:cSld>
@@ -7152,7 +7157,7 @@
     <a:masterClrMapping/>
   </p:clrMapOvr>
   <mc:AlternateContent xmlns:mc="http://schemas.openxmlformats.org/markup-compatibility/2006">
-    <mc:Choice xmlns:p14="http://schemas.microsoft.com/office/powerpoint/2010/main" xmlns="" Requires="p14">
+    <mc:Choice xmlns="" xmlns:p14="http://schemas.microsoft.com/office/powerpoint/2010/main" Requires="p14">
       <p:transition spd="slow" p14:dur="2000"/>
     </mc:Choice>
     <mc:Fallback>
@@ -7162,9 +7167,142 @@
   <p:timing>
     <p:tnLst>
       <p:par>
-        <p:cTn id="1" dur="indefinite" restart="never" nodeType="tmRoot"/>
+        <p:cTn id="1" dur="indefinite" restart="never" nodeType="tmRoot">
+          <p:childTnLst>
+            <p:seq concurrent="1" nextAc="seek">
+              <p:cTn id="2" dur="indefinite" nodeType="mainSeq">
+                <p:childTnLst>
+                  <p:par>
+                    <p:cTn id="3" fill="hold">
+                      <p:stCondLst>
+                        <p:cond delay="indefinite"/>
+                      </p:stCondLst>
+                      <p:childTnLst>
+                        <p:par>
+                          <p:cTn id="4" fill="hold">
+                            <p:stCondLst>
+                              <p:cond delay="0"/>
+                            </p:stCondLst>
+                            <p:childTnLst>
+                              <p:par>
+                                <p:cTn id="5" presetID="12" presetClass="entr" presetSubtype="4" fill="hold" grpId="0" nodeType="clickEffect">
+                                  <p:stCondLst>
+                                    <p:cond delay="0"/>
+                                  </p:stCondLst>
+                                  <p:childTnLst>
+                                    <p:set>
+                                      <p:cBhvr>
+                                        <p:cTn id="6" dur="1" fill="hold">
+                                          <p:stCondLst>
+                                            <p:cond delay="0"/>
+                                          </p:stCondLst>
+                                        </p:cTn>
+                                        <p:tgtEl>
+                                          <p:spTgt spid="7"/>
+                                        </p:tgtEl>
+                                        <p:attrNameLst>
+                                          <p:attrName>style.visibility</p:attrName>
+                                        </p:attrNameLst>
+                                      </p:cBhvr>
+                                      <p:to>
+                                        <p:strVal val="visible"/>
+                                      </p:to>
+                                    </p:set>
+                                    <p:animEffect transition="in" filter="slide(fromBottom)">
+                                      <p:cBhvr>
+                                        <p:cTn id="7" dur="500"/>
+                                        <p:tgtEl>
+                                          <p:spTgt spid="7"/>
+                                        </p:tgtEl>
+                                      </p:cBhvr>
+                                    </p:animEffect>
+                                  </p:childTnLst>
+                                </p:cTn>
+                              </p:par>
+                            </p:childTnLst>
+                          </p:cTn>
+                        </p:par>
+                      </p:childTnLst>
+                    </p:cTn>
+                  </p:par>
+                  <p:par>
+                    <p:cTn id="8" fill="hold">
+                      <p:stCondLst>
+                        <p:cond delay="indefinite"/>
+                      </p:stCondLst>
+                      <p:childTnLst>
+                        <p:par>
+                          <p:cTn id="9" fill="hold">
+                            <p:stCondLst>
+                              <p:cond delay="0"/>
+                            </p:stCondLst>
+                            <p:childTnLst>
+                              <p:par>
+                                <p:cTn id="10" presetID="12" presetClass="entr" presetSubtype="4" fill="hold" grpId="0" nodeType="clickEffect">
+                                  <p:stCondLst>
+                                    <p:cond delay="0"/>
+                                  </p:stCondLst>
+                                  <p:childTnLst>
+                                    <p:set>
+                                      <p:cBhvr>
+                                        <p:cTn id="11" dur="1" fill="hold">
+                                          <p:stCondLst>
+                                            <p:cond delay="0"/>
+                                          </p:stCondLst>
+                                        </p:cTn>
+                                        <p:tgtEl>
+                                          <p:spTgt spid="4"/>
+                                        </p:tgtEl>
+                                        <p:attrNameLst>
+                                          <p:attrName>style.visibility</p:attrName>
+                                        </p:attrNameLst>
+                                      </p:cBhvr>
+                                      <p:to>
+                                        <p:strVal val="visible"/>
+                                      </p:to>
+                                    </p:set>
+                                    <p:animEffect transition="in" filter="slide(fromBottom)">
+                                      <p:cBhvr>
+                                        <p:cTn id="12" dur="500"/>
+                                        <p:tgtEl>
+                                          <p:spTgt spid="4"/>
+                                        </p:tgtEl>
+                                      </p:cBhvr>
+                                    </p:animEffect>
+                                  </p:childTnLst>
+                                </p:cTn>
+                              </p:par>
+                            </p:childTnLst>
+                          </p:cTn>
+                        </p:par>
+                      </p:childTnLst>
+                    </p:cTn>
+                  </p:par>
+                </p:childTnLst>
+              </p:cTn>
+              <p:prevCondLst>
+                <p:cond evt="onPrev" delay="0">
+                  <p:tgtEl>
+                    <p:sldTgt/>
+                  </p:tgtEl>
+                </p:cond>
+              </p:prevCondLst>
+              <p:nextCondLst>
+                <p:cond evt="onNext" delay="0">
+                  <p:tgtEl>
+                    <p:sldTgt/>
+                  </p:tgtEl>
+                </p:cond>
+              </p:nextCondLst>
+            </p:seq>
+          </p:childTnLst>
+        </p:cTn>
       </p:par>
     </p:tnLst>
+    <p:bldLst>
+      <p:bldP spid="7" grpId="0"/>
+      <p:bldP spid="4" grpId="0"/>
+    </p:bldLst>
   </p:timing>
 </p:sld>
 </file>
@@ -7220,7 +7358,6 @@
               <a:rPr lang="it-IT" sz="2400" dirty="0" smtClean="0"/>
               <a:t>.</a:t>
             </a:r>
-            <a:endParaRPr lang="it-IT" sz="2400" dirty="0" smtClean="0"/>
           </a:p>
         </p:txBody>
       </p:sp>
@@ -7251,7 +7388,6 @@
               <a:rPr lang="it-IT" sz="4800" b="1" dirty="0" smtClean="0"/>
               <a:t>Gestione Eventi</a:t>
             </a:r>
-            <a:endParaRPr lang="it-IT" sz="4800" b="1" dirty="0" smtClean="0"/>
           </a:p>
           <a:p>
             <a:pPr algn="ctr"/>
@@ -7467,34 +7603,20 @@
               </a:rPr>
               <a:t>Pro</a:t>
             </a:r>
-            <a:endParaRPr lang="it-IT" dirty="0" smtClean="0">
-              <a:solidFill>
-                <a:srgbClr val="00B050"/>
-              </a:solidFill>
-            </a:endParaRPr>
           </a:p>
           <a:p>
             <a:pPr lvl="1"/>
             <a:r>
               <a:rPr lang="it-IT" dirty="0" smtClean="0"/>
-              <a:t> </a:t>
-            </a:r>
+              <a:t> Interfacce uniche per ogni tipologia d’utente</a:t>
+            </a:r>
+          </a:p>
+          <a:p>
+            <a:pPr lvl="1"/>
             <a:r>
               <a:rPr lang="it-IT" dirty="0" smtClean="0"/>
-              <a:t>Interfacce uniche per ogni tipologia d’utente</a:t>
-            </a:r>
-          </a:p>
-          <a:p>
-            <a:pPr lvl="1"/>
-            <a:r>
-              <a:rPr lang="it-IT" dirty="0" smtClean="0"/>
-              <a:t> </a:t>
-            </a:r>
-            <a:r>
-              <a:rPr lang="it-IT" dirty="0" smtClean="0"/>
-              <a:t>Input controllati</a:t>
-            </a:r>
-            <a:endParaRPr lang="it-IT" dirty="0" smtClean="0"/>
+              <a:t> Input controllati</a:t>
+            </a:r>
           </a:p>
           <a:p>
             <a:pPr lvl="1"/>
@@ -7502,14 +7624,13 @@
               <a:rPr lang="it-IT" dirty="0" smtClean="0"/>
               <a:t> Minore possibilità di introdurre errori</a:t>
             </a:r>
-            <a:endParaRPr lang="it-IT" dirty="0" smtClean="0"/>
           </a:p>
         </p:txBody>
       </p:sp>
     </p:spTree>
     <p:extLst>
       <p:ext uri="{BB962C8B-B14F-4D97-AF65-F5344CB8AC3E}">
-        <p14:creationId xmlns="" xmlns:p14="http://schemas.microsoft.com/office/powerpoint/2010/main" val="155874689"/>
+        <p14:creationId xmlns:p14="http://schemas.microsoft.com/office/powerpoint/2010/main" xmlns="" val="155874689"/>
       </p:ext>
     </p:extLst>
   </p:cSld>
@@ -7517,7 +7638,7 @@
     <a:masterClrMapping/>
   </p:clrMapOvr>
   <mc:AlternateContent xmlns:mc="http://schemas.openxmlformats.org/markup-compatibility/2006">
-    <mc:Choice xmlns="" xmlns:p14="http://schemas.microsoft.com/office/powerpoint/2010/main" Requires="p14">
+    <mc:Choice xmlns:p14="http://schemas.microsoft.com/office/powerpoint/2010/main" xmlns="" Requires="p14">
       <p:transition spd="slow" p14:dur="2000"/>
     </mc:Choice>
     <mc:Fallback>
@@ -7739,35 +7860,20 @@
               </a:rPr>
               <a:t>Contro</a:t>
             </a:r>
-            <a:endParaRPr lang="it-IT" dirty="0" smtClean="0">
-              <a:solidFill>
-                <a:srgbClr val="FF0000"/>
-              </a:solidFill>
-            </a:endParaRPr>
           </a:p>
           <a:p>
             <a:pPr lvl="1"/>
             <a:r>
               <a:rPr lang="it-IT" dirty="0" smtClean="0"/>
-              <a:t> </a:t>
-            </a:r>
+              <a:t> Difficile da gestire</a:t>
+            </a:r>
+          </a:p>
+          <a:p>
+            <a:pPr lvl="1"/>
             <a:r>
               <a:rPr lang="it-IT" dirty="0" smtClean="0"/>
-              <a:t>Difficile da gestire</a:t>
-            </a:r>
-            <a:endParaRPr lang="it-IT" dirty="0" smtClean="0"/>
-          </a:p>
-          <a:p>
-            <a:pPr lvl="1"/>
-            <a:r>
-              <a:rPr lang="it-IT" dirty="0" smtClean="0"/>
-              <a:t> </a:t>
-            </a:r>
-            <a:r>
-              <a:rPr lang="it-IT" dirty="0" smtClean="0"/>
-              <a:t>Introduzione di controlli </a:t>
-            </a:r>
-            <a:endParaRPr lang="it-IT" dirty="0" smtClean="0"/>
+              <a:t> Introduzione di controlli </a:t>
+            </a:r>
           </a:p>
           <a:p>
             <a:pPr lvl="1"/>
@@ -7775,7 +7881,6 @@
               <a:rPr lang="it-IT" dirty="0" smtClean="0"/>
               <a:t> Difficoltà nell’aggiunta di nuove tipologie d’utenti</a:t>
             </a:r>
-            <a:endParaRPr lang="it-IT" dirty="0" smtClean="0"/>
           </a:p>
         </p:txBody>
       </p:sp>
@@ -7818,7 +7923,7 @@
     </p:spTree>
     <p:extLst>
       <p:ext uri="{BB962C8B-B14F-4D97-AF65-F5344CB8AC3E}">
-        <p14:creationId xmlns="" xmlns:p14="http://schemas.microsoft.com/office/powerpoint/2010/main" val="155874689"/>
+        <p14:creationId xmlns:p14="http://schemas.microsoft.com/office/powerpoint/2010/main" xmlns="" val="155874689"/>
       </p:ext>
     </p:extLst>
   </p:cSld>
@@ -7826,7 +7931,7 @@
     <a:masterClrMapping/>
   </p:clrMapOvr>
   <mc:AlternateContent xmlns:mc="http://schemas.openxmlformats.org/markup-compatibility/2006">
-    <mc:Choice xmlns="" xmlns:p14="http://schemas.microsoft.com/office/powerpoint/2010/main" Requires="p14">
+    <mc:Choice xmlns:p14="http://schemas.microsoft.com/office/powerpoint/2010/main" xmlns="" Requires="p14">
       <p:transition spd="slow" p14:dur="2000"/>
     </mc:Choice>
     <mc:Fallback>

</xml_diff>